<commit_message>
Use 2024 files to reproduce paper
Weibull option in prior function of Bayes_flex_strength_2024.ipyn
</commit_message>
<xml_diff>
--- a/manuscript_figs_2024.pptx
+++ b/manuscript_figs_2024.pptx
@@ -260,7 +260,7 @@
           <a:p>
             <a:fld id="{3EEB84BD-E408-A246-BE1A-DAA9D5E996C6}" type="datetimeFigureOut">
               <a:rPr lang="en-US" smtClean="0"/>
-              <a:t>1/26/24</a:t>
+              <a:t>1/30/24</a:t>
             </a:fld>
             <a:endParaRPr lang="en-US"/>
           </a:p>
@@ -458,7 +458,7 @@
           <a:p>
             <a:fld id="{3EEB84BD-E408-A246-BE1A-DAA9D5E996C6}" type="datetimeFigureOut">
               <a:rPr lang="en-US" smtClean="0"/>
-              <a:t>1/26/24</a:t>
+              <a:t>1/30/24</a:t>
             </a:fld>
             <a:endParaRPr lang="en-US"/>
           </a:p>
@@ -666,7 +666,7 @@
           <a:p>
             <a:fld id="{3EEB84BD-E408-A246-BE1A-DAA9D5E996C6}" type="datetimeFigureOut">
               <a:rPr lang="en-US" smtClean="0"/>
-              <a:t>1/26/24</a:t>
+              <a:t>1/30/24</a:t>
             </a:fld>
             <a:endParaRPr lang="en-US"/>
           </a:p>
@@ -864,7 +864,7 @@
           <a:p>
             <a:fld id="{3EEB84BD-E408-A246-BE1A-DAA9D5E996C6}" type="datetimeFigureOut">
               <a:rPr lang="en-US" smtClean="0"/>
-              <a:t>1/26/24</a:t>
+              <a:t>1/30/24</a:t>
             </a:fld>
             <a:endParaRPr lang="en-US"/>
           </a:p>
@@ -1139,7 +1139,7 @@
           <a:p>
             <a:fld id="{3EEB84BD-E408-A246-BE1A-DAA9D5E996C6}" type="datetimeFigureOut">
               <a:rPr lang="en-US" smtClean="0"/>
-              <a:t>1/26/24</a:t>
+              <a:t>1/30/24</a:t>
             </a:fld>
             <a:endParaRPr lang="en-US"/>
           </a:p>
@@ -1404,7 +1404,7 @@
           <a:p>
             <a:fld id="{3EEB84BD-E408-A246-BE1A-DAA9D5E996C6}" type="datetimeFigureOut">
               <a:rPr lang="en-US" smtClean="0"/>
-              <a:t>1/26/24</a:t>
+              <a:t>1/30/24</a:t>
             </a:fld>
             <a:endParaRPr lang="en-US"/>
           </a:p>
@@ -1816,7 +1816,7 @@
           <a:p>
             <a:fld id="{3EEB84BD-E408-A246-BE1A-DAA9D5E996C6}" type="datetimeFigureOut">
               <a:rPr lang="en-US" smtClean="0"/>
-              <a:t>1/26/24</a:t>
+              <a:t>1/30/24</a:t>
             </a:fld>
             <a:endParaRPr lang="en-US"/>
           </a:p>
@@ -1957,7 +1957,7 @@
           <a:p>
             <a:fld id="{3EEB84BD-E408-A246-BE1A-DAA9D5E996C6}" type="datetimeFigureOut">
               <a:rPr lang="en-US" smtClean="0"/>
-              <a:t>1/26/24</a:t>
+              <a:t>1/30/24</a:t>
             </a:fld>
             <a:endParaRPr lang="en-US"/>
           </a:p>
@@ -2070,7 +2070,7 @@
           <a:p>
             <a:fld id="{3EEB84BD-E408-A246-BE1A-DAA9D5E996C6}" type="datetimeFigureOut">
               <a:rPr lang="en-US" smtClean="0"/>
-              <a:t>1/26/24</a:t>
+              <a:t>1/30/24</a:t>
             </a:fld>
             <a:endParaRPr lang="en-US"/>
           </a:p>
@@ -2381,7 +2381,7 @@
           <a:p>
             <a:fld id="{3EEB84BD-E408-A246-BE1A-DAA9D5E996C6}" type="datetimeFigureOut">
               <a:rPr lang="en-US" smtClean="0"/>
-              <a:t>1/26/24</a:t>
+              <a:t>1/30/24</a:t>
             </a:fld>
             <a:endParaRPr lang="en-US"/>
           </a:p>
@@ -2669,7 +2669,7 @@
           <a:p>
             <a:fld id="{3EEB84BD-E408-A246-BE1A-DAA9D5E996C6}" type="datetimeFigureOut">
               <a:rPr lang="en-US" smtClean="0"/>
-              <a:t>1/26/24</a:t>
+              <a:t>1/30/24</a:t>
             </a:fld>
             <a:endParaRPr lang="en-US"/>
           </a:p>
@@ -2910,7 +2910,7 @@
           <a:p>
             <a:fld id="{3EEB84BD-E408-A246-BE1A-DAA9D5E996C6}" type="datetimeFigureOut">
               <a:rPr lang="en-US" smtClean="0"/>
-              <a:t>1/26/24</a:t>
+              <a:t>1/30/24</a:t>
             </a:fld>
             <a:endParaRPr lang="en-US"/>
           </a:p>
@@ -3329,10 +3329,10 @@
       </p:grpSpPr>
       <p:pic>
         <p:nvPicPr>
-          <p:cNvPr id="7" name="Picture 6">
-            <a:extLst>
-              <a:ext uri="{FF2B5EF4-FFF2-40B4-BE49-F238E27FC236}">
-                <a16:creationId xmlns:a16="http://schemas.microsoft.com/office/drawing/2014/main" id="{120A5E79-FBB0-E9BE-967E-1969E8BD1088}"/>
+          <p:cNvPr id="13" name="Picture 12">
+            <a:extLst>
+              <a:ext uri="{FF2B5EF4-FFF2-40B4-BE49-F238E27FC236}">
+                <a16:creationId xmlns:a16="http://schemas.microsoft.com/office/drawing/2014/main" id="{32545281-AF16-EB53-E3A2-731080C8026A}"/>
               </a:ext>
             </a:extLst>
           </p:cNvPr>
@@ -3349,20 +3349,195 @@
         </p:blipFill>
         <p:spPr>
           <a:xfrm>
-            <a:off x="625141" y="642862"/>
-            <a:ext cx="7772400" cy="3190658"/>
+            <a:off x="8329447" y="889435"/>
+            <a:ext cx="3189911" cy="1701777"/>
           </a:xfrm>
           <a:prstGeom prst="rect">
             <a:avLst/>
           </a:prstGeom>
         </p:spPr>
       </p:pic>
+      <p:sp>
+        <p:nvSpPr>
+          <p:cNvPr id="22" name="TextBox 21">
+            <a:extLst>
+              <a:ext uri="{FF2B5EF4-FFF2-40B4-BE49-F238E27FC236}">
+                <a16:creationId xmlns:a16="http://schemas.microsoft.com/office/drawing/2014/main" id="{64E27A1B-4357-13F0-FB4E-6F77A5208B06}"/>
+              </a:ext>
+            </a:extLst>
+          </p:cNvPr>
+          <p:cNvSpPr txBox="1"/>
+          <p:nvPr/>
+        </p:nvSpPr>
+        <p:spPr>
+          <a:xfrm>
+            <a:off x="587705" y="527344"/>
+            <a:ext cx="436338" cy="369332"/>
+          </a:xfrm>
+          <a:prstGeom prst="rect">
+            <a:avLst/>
+          </a:prstGeom>
+          <a:noFill/>
+        </p:spPr>
+        <p:txBody>
+          <a:bodyPr wrap="none" rtlCol="0">
+            <a:spAutoFit/>
+          </a:bodyPr>
+          <a:lstStyle/>
+          <a:p>
+            <a:r>
+              <a:rPr lang="en-US" dirty="0"/>
+              <a:t>(a)</a:t>
+            </a:r>
+          </a:p>
+        </p:txBody>
+      </p:sp>
+      <p:sp>
+        <p:nvSpPr>
+          <p:cNvPr id="23" name="TextBox 22">
+            <a:extLst>
+              <a:ext uri="{FF2B5EF4-FFF2-40B4-BE49-F238E27FC236}">
+                <a16:creationId xmlns:a16="http://schemas.microsoft.com/office/drawing/2014/main" id="{494FE80D-28FB-CEE9-1043-C5E94E233606}"/>
+              </a:ext>
+            </a:extLst>
+          </p:cNvPr>
+          <p:cNvSpPr txBox="1"/>
+          <p:nvPr/>
+        </p:nvSpPr>
+        <p:spPr>
+          <a:xfrm>
+            <a:off x="8242170" y="796973"/>
+            <a:ext cx="447558" cy="369332"/>
+          </a:xfrm>
+          <a:prstGeom prst="rect">
+            <a:avLst/>
+          </a:prstGeom>
+          <a:noFill/>
+        </p:spPr>
+        <p:txBody>
+          <a:bodyPr wrap="none" rtlCol="0">
+            <a:spAutoFit/>
+          </a:bodyPr>
+          <a:lstStyle/>
+          <a:p>
+            <a:r>
+              <a:rPr lang="en-US" dirty="0"/>
+              <a:t>(b)</a:t>
+            </a:r>
+          </a:p>
+        </p:txBody>
+      </p:sp>
+      <p:sp>
+        <p:nvSpPr>
+          <p:cNvPr id="24" name="TextBox 23">
+            <a:extLst>
+              <a:ext uri="{FF2B5EF4-FFF2-40B4-BE49-F238E27FC236}">
+                <a16:creationId xmlns:a16="http://schemas.microsoft.com/office/drawing/2014/main" id="{5C495469-0B02-E325-E76F-A90D5AFD567D}"/>
+              </a:ext>
+            </a:extLst>
+          </p:cNvPr>
+          <p:cNvSpPr txBox="1"/>
+          <p:nvPr/>
+        </p:nvSpPr>
+        <p:spPr>
+          <a:xfrm>
+            <a:off x="8259669" y="2371593"/>
+            <a:ext cx="423514" cy="369332"/>
+          </a:xfrm>
+          <a:prstGeom prst="rect">
+            <a:avLst/>
+          </a:prstGeom>
+          <a:noFill/>
+        </p:spPr>
+        <p:txBody>
+          <a:bodyPr wrap="none" rtlCol="0">
+            <a:spAutoFit/>
+          </a:bodyPr>
+          <a:lstStyle/>
+          <a:p>
+            <a:r>
+              <a:rPr lang="en-US" dirty="0"/>
+              <a:t>(c)</a:t>
+            </a:r>
+          </a:p>
+        </p:txBody>
+      </p:sp>
+      <p:sp>
+        <p:nvSpPr>
+          <p:cNvPr id="25" name="TextBox 24">
+            <a:extLst>
+              <a:ext uri="{FF2B5EF4-FFF2-40B4-BE49-F238E27FC236}">
+                <a16:creationId xmlns:a16="http://schemas.microsoft.com/office/drawing/2014/main" id="{60337344-E7F8-FC9E-B4C6-EFB02BF83CA7}"/>
+              </a:ext>
+            </a:extLst>
+          </p:cNvPr>
+          <p:cNvSpPr txBox="1"/>
+          <p:nvPr/>
+        </p:nvSpPr>
+        <p:spPr>
+          <a:xfrm>
+            <a:off x="594117" y="3511688"/>
+            <a:ext cx="447558" cy="369332"/>
+          </a:xfrm>
+          <a:prstGeom prst="rect">
+            <a:avLst/>
+          </a:prstGeom>
+          <a:noFill/>
+        </p:spPr>
+        <p:txBody>
+          <a:bodyPr wrap="none" rtlCol="0">
+            <a:spAutoFit/>
+          </a:bodyPr>
+          <a:lstStyle/>
+          <a:p>
+            <a:r>
+              <a:rPr lang="en-US" dirty="0"/>
+              <a:t>(d)</a:t>
+            </a:r>
+          </a:p>
+        </p:txBody>
+      </p:sp>
+      <p:sp>
+        <p:nvSpPr>
+          <p:cNvPr id="26" name="TextBox 25">
+            <a:extLst>
+              <a:ext uri="{FF2B5EF4-FFF2-40B4-BE49-F238E27FC236}">
+                <a16:creationId xmlns:a16="http://schemas.microsoft.com/office/drawing/2014/main" id="{DD500B49-5D77-3A82-FE43-A4EE52321F82}"/>
+              </a:ext>
+            </a:extLst>
+          </p:cNvPr>
+          <p:cNvSpPr txBox="1"/>
+          <p:nvPr/>
+        </p:nvSpPr>
+        <p:spPr>
+          <a:xfrm>
+            <a:off x="8248582" y="4357769"/>
+            <a:ext cx="441146" cy="369332"/>
+          </a:xfrm>
+          <a:prstGeom prst="rect">
+            <a:avLst/>
+          </a:prstGeom>
+          <a:noFill/>
+        </p:spPr>
+        <p:txBody>
+          <a:bodyPr wrap="none" rtlCol="0">
+            <a:spAutoFit/>
+          </a:bodyPr>
+          <a:lstStyle/>
+          <a:p>
+            <a:r>
+              <a:rPr lang="en-US" dirty="0"/>
+              <a:t>(e)</a:t>
+            </a:r>
+          </a:p>
+        </p:txBody>
+      </p:sp>
       <p:pic>
         <p:nvPicPr>
-          <p:cNvPr id="13" name="Picture 12">
-            <a:extLst>
-              <a:ext uri="{FF2B5EF4-FFF2-40B4-BE49-F238E27FC236}">
-                <a16:creationId xmlns:a16="http://schemas.microsoft.com/office/drawing/2014/main" id="{32545281-AF16-EB53-E3A2-731080C8026A}"/>
+          <p:cNvPr id="4" name="Picture 3">
+            <a:extLst>
+              <a:ext uri="{FF2B5EF4-FFF2-40B4-BE49-F238E27FC236}">
+                <a16:creationId xmlns:a16="http://schemas.microsoft.com/office/drawing/2014/main" id="{D4247044-8675-2EF4-8FA5-DBDC0449FEDE}"/>
               </a:ext>
             </a:extLst>
           </p:cNvPr>
@@ -3379,195 +3554,20 @@
         </p:blipFill>
         <p:spPr>
           <a:xfrm>
-            <a:off x="8376948" y="890758"/>
-            <a:ext cx="3098394" cy="1652954"/>
+            <a:off x="8376948" y="4679602"/>
+            <a:ext cx="3189911" cy="2157206"/>
           </a:xfrm>
           <a:prstGeom prst="rect">
             <a:avLst/>
           </a:prstGeom>
         </p:spPr>
       </p:pic>
-      <p:sp>
-        <p:nvSpPr>
-          <p:cNvPr id="22" name="TextBox 21">
-            <a:extLst>
-              <a:ext uri="{FF2B5EF4-FFF2-40B4-BE49-F238E27FC236}">
-                <a16:creationId xmlns:a16="http://schemas.microsoft.com/office/drawing/2014/main" id="{64E27A1B-4357-13F0-FB4E-6F77A5208B06}"/>
-              </a:ext>
-            </a:extLst>
-          </p:cNvPr>
-          <p:cNvSpPr txBox="1"/>
-          <p:nvPr/>
-        </p:nvSpPr>
-        <p:spPr>
-          <a:xfrm>
-            <a:off x="587705" y="527344"/>
-            <a:ext cx="436338" cy="369332"/>
-          </a:xfrm>
-          <a:prstGeom prst="rect">
-            <a:avLst/>
-          </a:prstGeom>
-          <a:noFill/>
-        </p:spPr>
-        <p:txBody>
-          <a:bodyPr wrap="none" rtlCol="0">
-            <a:spAutoFit/>
-          </a:bodyPr>
-          <a:lstStyle/>
-          <a:p>
-            <a:r>
-              <a:rPr lang="en-US" dirty="0"/>
-              <a:t>(a)</a:t>
-            </a:r>
-          </a:p>
-        </p:txBody>
-      </p:sp>
-      <p:sp>
-        <p:nvSpPr>
-          <p:cNvPr id="23" name="TextBox 22">
-            <a:extLst>
-              <a:ext uri="{FF2B5EF4-FFF2-40B4-BE49-F238E27FC236}">
-                <a16:creationId xmlns:a16="http://schemas.microsoft.com/office/drawing/2014/main" id="{494FE80D-28FB-CEE9-1043-C5E94E233606}"/>
-              </a:ext>
-            </a:extLst>
-          </p:cNvPr>
-          <p:cNvSpPr txBox="1"/>
-          <p:nvPr/>
-        </p:nvSpPr>
-        <p:spPr>
-          <a:xfrm>
-            <a:off x="8242170" y="796973"/>
-            <a:ext cx="447558" cy="369332"/>
-          </a:xfrm>
-          <a:prstGeom prst="rect">
-            <a:avLst/>
-          </a:prstGeom>
-          <a:noFill/>
-        </p:spPr>
-        <p:txBody>
-          <a:bodyPr wrap="none" rtlCol="0">
-            <a:spAutoFit/>
-          </a:bodyPr>
-          <a:lstStyle/>
-          <a:p>
-            <a:r>
-              <a:rPr lang="en-US" dirty="0"/>
-              <a:t>(b)</a:t>
-            </a:r>
-          </a:p>
-        </p:txBody>
-      </p:sp>
-      <p:sp>
-        <p:nvSpPr>
-          <p:cNvPr id="24" name="TextBox 23">
-            <a:extLst>
-              <a:ext uri="{FF2B5EF4-FFF2-40B4-BE49-F238E27FC236}">
-                <a16:creationId xmlns:a16="http://schemas.microsoft.com/office/drawing/2014/main" id="{5C495469-0B02-E325-E76F-A90D5AFD567D}"/>
-              </a:ext>
-            </a:extLst>
-          </p:cNvPr>
-          <p:cNvSpPr txBox="1"/>
-          <p:nvPr/>
-        </p:nvSpPr>
-        <p:spPr>
-          <a:xfrm>
-            <a:off x="8259669" y="2371593"/>
-            <a:ext cx="423514" cy="369332"/>
-          </a:xfrm>
-          <a:prstGeom prst="rect">
-            <a:avLst/>
-          </a:prstGeom>
-          <a:noFill/>
-        </p:spPr>
-        <p:txBody>
-          <a:bodyPr wrap="none" rtlCol="0">
-            <a:spAutoFit/>
-          </a:bodyPr>
-          <a:lstStyle/>
-          <a:p>
-            <a:r>
-              <a:rPr lang="en-US" dirty="0"/>
-              <a:t>(c)</a:t>
-            </a:r>
-          </a:p>
-        </p:txBody>
-      </p:sp>
-      <p:sp>
-        <p:nvSpPr>
-          <p:cNvPr id="25" name="TextBox 24">
-            <a:extLst>
-              <a:ext uri="{FF2B5EF4-FFF2-40B4-BE49-F238E27FC236}">
-                <a16:creationId xmlns:a16="http://schemas.microsoft.com/office/drawing/2014/main" id="{60337344-E7F8-FC9E-B4C6-EFB02BF83CA7}"/>
-              </a:ext>
-            </a:extLst>
-          </p:cNvPr>
-          <p:cNvSpPr txBox="1"/>
-          <p:nvPr/>
-        </p:nvSpPr>
-        <p:spPr>
-          <a:xfrm>
-            <a:off x="594117" y="3511688"/>
-            <a:ext cx="447558" cy="369332"/>
-          </a:xfrm>
-          <a:prstGeom prst="rect">
-            <a:avLst/>
-          </a:prstGeom>
-          <a:noFill/>
-        </p:spPr>
-        <p:txBody>
-          <a:bodyPr wrap="none" rtlCol="0">
-            <a:spAutoFit/>
-          </a:bodyPr>
-          <a:lstStyle/>
-          <a:p>
-            <a:r>
-              <a:rPr lang="en-US" dirty="0"/>
-              <a:t>(d)</a:t>
-            </a:r>
-          </a:p>
-        </p:txBody>
-      </p:sp>
-      <p:sp>
-        <p:nvSpPr>
-          <p:cNvPr id="26" name="TextBox 25">
-            <a:extLst>
-              <a:ext uri="{FF2B5EF4-FFF2-40B4-BE49-F238E27FC236}">
-                <a16:creationId xmlns:a16="http://schemas.microsoft.com/office/drawing/2014/main" id="{DD500B49-5D77-3A82-FE43-A4EE52321F82}"/>
-              </a:ext>
-            </a:extLst>
-          </p:cNvPr>
-          <p:cNvSpPr txBox="1"/>
-          <p:nvPr/>
-        </p:nvSpPr>
-        <p:spPr>
-          <a:xfrm>
-            <a:off x="8248582" y="4357769"/>
-            <a:ext cx="441146" cy="369332"/>
-          </a:xfrm>
-          <a:prstGeom prst="rect">
-            <a:avLst/>
-          </a:prstGeom>
-          <a:noFill/>
-        </p:spPr>
-        <p:txBody>
-          <a:bodyPr wrap="none" rtlCol="0">
-            <a:spAutoFit/>
-          </a:bodyPr>
-          <a:lstStyle/>
-          <a:p>
-            <a:r>
-              <a:rPr lang="en-US" dirty="0"/>
-              <a:t>(e)</a:t>
-            </a:r>
-          </a:p>
-        </p:txBody>
-      </p:sp>
       <p:pic>
         <p:nvPicPr>
-          <p:cNvPr id="3" name="Picture 2">
-            <a:extLst>
-              <a:ext uri="{FF2B5EF4-FFF2-40B4-BE49-F238E27FC236}">
-                <a16:creationId xmlns:a16="http://schemas.microsoft.com/office/drawing/2014/main" id="{473BAA34-9748-33BE-CAA3-2C56ADCCAA63}"/>
+          <p:cNvPr id="8" name="Picture 7">
+            <a:extLst>
+              <a:ext uri="{FF2B5EF4-FFF2-40B4-BE49-F238E27FC236}">
+                <a16:creationId xmlns:a16="http://schemas.microsoft.com/office/drawing/2014/main" id="{4ED57970-8C82-A48A-42A4-9CD32DD63D39}"/>
               </a:ext>
             </a:extLst>
           </p:cNvPr>
@@ -3584,7 +3584,7 @@
         </p:blipFill>
         <p:spPr>
           <a:xfrm>
-            <a:off x="625141" y="3648854"/>
+            <a:off x="616233" y="3646150"/>
             <a:ext cx="7772400" cy="3190658"/>
           </a:xfrm>
           <a:prstGeom prst="rect">
@@ -3594,10 +3594,10 @@
       </p:pic>
       <p:pic>
         <p:nvPicPr>
-          <p:cNvPr id="5" name="Picture 4">
-            <a:extLst>
-              <a:ext uri="{FF2B5EF4-FFF2-40B4-BE49-F238E27FC236}">
-                <a16:creationId xmlns:a16="http://schemas.microsoft.com/office/drawing/2014/main" id="{A6362070-9203-D70F-FDAD-C50763A6413E}"/>
+          <p:cNvPr id="11" name="Picture 10">
+            <a:extLst>
+              <a:ext uri="{FF2B5EF4-FFF2-40B4-BE49-F238E27FC236}">
+                <a16:creationId xmlns:a16="http://schemas.microsoft.com/office/drawing/2014/main" id="{8E87AC4D-2351-E92B-BC6B-367AD7A2D0E2}"/>
               </a:ext>
             </a:extLst>
           </p:cNvPr>
@@ -3614,8 +3614,8 @@
         </p:blipFill>
         <p:spPr>
           <a:xfrm>
-            <a:off x="8465949" y="4589935"/>
-            <a:ext cx="3269623" cy="2081340"/>
+            <a:off x="8376948" y="2576843"/>
+            <a:ext cx="3321152" cy="2157984"/>
           </a:xfrm>
           <a:prstGeom prst="rect">
             <a:avLst/>
@@ -3624,10 +3624,10 @@
       </p:pic>
       <p:pic>
         <p:nvPicPr>
-          <p:cNvPr id="9" name="Picture 8">
-            <a:extLst>
-              <a:ext uri="{FF2B5EF4-FFF2-40B4-BE49-F238E27FC236}">
-                <a16:creationId xmlns:a16="http://schemas.microsoft.com/office/drawing/2014/main" id="{EEF196D3-A417-6915-6636-024A545FF538}"/>
+          <p:cNvPr id="14" name="Picture 13">
+            <a:extLst>
+              <a:ext uri="{FF2B5EF4-FFF2-40B4-BE49-F238E27FC236}">
+                <a16:creationId xmlns:a16="http://schemas.microsoft.com/office/drawing/2014/main" id="{A18A7632-0500-C2EB-E777-A09D677BB8FA}"/>
               </a:ext>
             </a:extLst>
           </p:cNvPr>
@@ -3644,8 +3644,8 @@
         </p:blipFill>
         <p:spPr>
           <a:xfrm>
-            <a:off x="8434977" y="2564723"/>
-            <a:ext cx="3223021" cy="2089407"/>
+            <a:off x="604548" y="776264"/>
+            <a:ext cx="7772400" cy="3190658"/>
           </a:xfrm>
           <a:prstGeom prst="rect">
             <a:avLst/>

</xml_diff>